<commit_message>
updated Vertex Level LSTM slides
</commit_message>
<xml_diff>
--- a/Analysis/RAVE/Vertex level LSTM/Vertex level LSTM.pptx
+++ b/Analysis/RAVE/Vertex level LSTM/Vertex level LSTM.pptx
@@ -5,9 +5,10 @@
     <p:sldMasterId id="2147483648" r:id="rId1"/>
   </p:sldMasterIdLst>
   <p:sldIdLst>
-    <p:sldId id="257" r:id="rId2"/>
-    <p:sldId id="258" r:id="rId3"/>
-    <p:sldId id="259" r:id="rId4"/>
+    <p:sldId id="260" r:id="rId2"/>
+    <p:sldId id="257" r:id="rId3"/>
+    <p:sldId id="261" r:id="rId4"/>
+    <p:sldId id="259" r:id="rId5"/>
   </p:sldIdLst>
   <p:sldSz cx="12192000" cy="6858000"/>
   <p:notesSz cx="6858000" cy="9144000"/>
@@ -106,6 +107,11 @@
       </a:defRPr>
     </a:lvl9pPr>
   </p:defaultTextStyle>
+  <p:extLst>
+    <p:ext uri="{EFAFB233-063F-42B5-8137-9DF3F51BA10A}">
+      <p15:sldGuideLst xmlns:p15="http://schemas.microsoft.com/office/powerpoint/2012/main"/>
+    </p:ext>
+  </p:extLst>
 </p:presentation>
 </file>
 
@@ -256,7 +262,7 @@
           <a:p>
             <a:fld id="{3C1B4220-5217-4FA3-A334-B2FA2DD7CE7B}" type="datetimeFigureOut">
               <a:rPr lang="en-US" smtClean="0"/>
-              <a:t>9/13/2020</a:t>
+              <a:t>9/15/2020</a:t>
             </a:fld>
             <a:endParaRPr lang="en-US"/>
           </a:p>
@@ -454,7 +460,7 @@
           <a:p>
             <a:fld id="{3C1B4220-5217-4FA3-A334-B2FA2DD7CE7B}" type="datetimeFigureOut">
               <a:rPr lang="en-US" smtClean="0"/>
-              <a:t>9/13/2020</a:t>
+              <a:t>9/15/2020</a:t>
             </a:fld>
             <a:endParaRPr lang="en-US"/>
           </a:p>
@@ -662,7 +668,7 @@
           <a:p>
             <a:fld id="{3C1B4220-5217-4FA3-A334-B2FA2DD7CE7B}" type="datetimeFigureOut">
               <a:rPr lang="en-US" smtClean="0"/>
-              <a:t>9/13/2020</a:t>
+              <a:t>9/15/2020</a:t>
             </a:fld>
             <a:endParaRPr lang="en-US"/>
           </a:p>
@@ -860,7 +866,7 @@
           <a:p>
             <a:fld id="{3C1B4220-5217-4FA3-A334-B2FA2DD7CE7B}" type="datetimeFigureOut">
               <a:rPr lang="en-US" smtClean="0"/>
-              <a:t>9/13/2020</a:t>
+              <a:t>9/15/2020</a:t>
             </a:fld>
             <a:endParaRPr lang="en-US"/>
           </a:p>
@@ -1135,7 +1141,7 @@
           <a:p>
             <a:fld id="{3C1B4220-5217-4FA3-A334-B2FA2DD7CE7B}" type="datetimeFigureOut">
               <a:rPr lang="en-US" smtClean="0"/>
-              <a:t>9/13/2020</a:t>
+              <a:t>9/15/2020</a:t>
             </a:fld>
             <a:endParaRPr lang="en-US"/>
           </a:p>
@@ -1400,7 +1406,7 @@
           <a:p>
             <a:fld id="{3C1B4220-5217-4FA3-A334-B2FA2DD7CE7B}" type="datetimeFigureOut">
               <a:rPr lang="en-US" smtClean="0"/>
-              <a:t>9/13/2020</a:t>
+              <a:t>9/15/2020</a:t>
             </a:fld>
             <a:endParaRPr lang="en-US"/>
           </a:p>
@@ -1812,7 +1818,7 @@
           <a:p>
             <a:fld id="{3C1B4220-5217-4FA3-A334-B2FA2DD7CE7B}" type="datetimeFigureOut">
               <a:rPr lang="en-US" smtClean="0"/>
-              <a:t>9/13/2020</a:t>
+              <a:t>9/15/2020</a:t>
             </a:fld>
             <a:endParaRPr lang="en-US"/>
           </a:p>
@@ -1953,7 +1959,7 @@
           <a:p>
             <a:fld id="{3C1B4220-5217-4FA3-A334-B2FA2DD7CE7B}" type="datetimeFigureOut">
               <a:rPr lang="en-US" smtClean="0"/>
-              <a:t>9/13/2020</a:t>
+              <a:t>9/15/2020</a:t>
             </a:fld>
             <a:endParaRPr lang="en-US"/>
           </a:p>
@@ -2066,7 +2072,7 @@
           <a:p>
             <a:fld id="{3C1B4220-5217-4FA3-A334-B2FA2DD7CE7B}" type="datetimeFigureOut">
               <a:rPr lang="en-US" smtClean="0"/>
-              <a:t>9/13/2020</a:t>
+              <a:t>9/15/2020</a:t>
             </a:fld>
             <a:endParaRPr lang="en-US"/>
           </a:p>
@@ -2377,7 +2383,7 @@
           <a:p>
             <a:fld id="{3C1B4220-5217-4FA3-A334-B2FA2DD7CE7B}" type="datetimeFigureOut">
               <a:rPr lang="en-US" smtClean="0"/>
-              <a:t>9/13/2020</a:t>
+              <a:t>9/15/2020</a:t>
             </a:fld>
             <a:endParaRPr lang="en-US"/>
           </a:p>
@@ -2665,7 +2671,7 @@
           <a:p>
             <a:fld id="{3C1B4220-5217-4FA3-A334-B2FA2DD7CE7B}" type="datetimeFigureOut">
               <a:rPr lang="en-US" smtClean="0"/>
-              <a:t>9/13/2020</a:t>
+              <a:t>9/15/2020</a:t>
             </a:fld>
             <a:endParaRPr lang="en-US"/>
           </a:p>
@@ -2906,7 +2912,7 @@
           <a:p>
             <a:fld id="{3C1B4220-5217-4FA3-A334-B2FA2DD7CE7B}" type="datetimeFigureOut">
               <a:rPr lang="en-US" smtClean="0"/>
-              <a:t>9/13/2020</a:t>
+              <a:t>9/15/2020</a:t>
             </a:fld>
             <a:endParaRPr lang="en-US"/>
           </a:p>
@@ -3328,7 +3334,7 @@
           <p:cNvPr id="2" name="Title 1">
             <a:extLst>
               <a:ext uri="{FF2B5EF4-FFF2-40B4-BE49-F238E27FC236}">
-                <a16:creationId xmlns:a16="http://schemas.microsoft.com/office/drawing/2014/main" id="{988D4FAE-82D0-4146-AC2A-F516C314BC20}"/>
+                <a16:creationId xmlns:a16="http://schemas.microsoft.com/office/drawing/2014/main" id="{B7049A64-2672-414F-AFE4-5F350B4A861B}"/>
               </a:ext>
             </a:extLst>
           </p:cNvPr>
@@ -3346,17 +3352,17 @@
           <a:p>
             <a:r>
               <a:rPr lang="en-US" dirty="0"/>
-              <a:t>Jet representation	</a:t>
-            </a:r>
-          </a:p>
-        </p:txBody>
-      </p:sp>
-      <p:sp>
-        <p:nvSpPr>
-          <p:cNvPr id="7" name="Content Placeholder 6">
-            <a:extLst>
-              <a:ext uri="{FF2B5EF4-FFF2-40B4-BE49-F238E27FC236}">
-                <a16:creationId xmlns:a16="http://schemas.microsoft.com/office/drawing/2014/main" id="{893B2DB4-C7D2-4EC1-B7A0-4B53CF8494C1}"/>
+              <a:t>Data</a:t>
+            </a:r>
+          </a:p>
+        </p:txBody>
+      </p:sp>
+      <p:sp>
+        <p:nvSpPr>
+          <p:cNvPr id="3" name="Content Placeholder 2">
+            <a:extLst>
+              <a:ext uri="{FF2B5EF4-FFF2-40B4-BE49-F238E27FC236}">
+                <a16:creationId xmlns:a16="http://schemas.microsoft.com/office/drawing/2014/main" id="{6F7E11EE-2EB4-4F2B-9307-83D465CBCA83}"/>
               </a:ext>
             </a:extLst>
           </p:cNvPr>
@@ -3374,27 +3380,19 @@
           <a:p>
             <a:r>
               <a:rPr lang="en-US" dirty="0"/>
-              <a:t>Ten vertices with shortest displacement are extracted from each jet.</a:t>
+              <a:t>bb~ and dark jets  58K training examples and 30K  test examples each.</a:t>
             </a:r>
           </a:p>
           <a:p>
             <a:r>
               <a:rPr lang="en-US" dirty="0"/>
-              <a:t>The data fields for each vertex are: vertex displacement, vertex multiplicity, and the magnitude of the vector sum of constituent PT.</a:t>
+              <a:t>Jet radius = 0.7.</a:t>
             </a:r>
           </a:p>
           <a:p>
             <a:r>
               <a:rPr lang="en-US" dirty="0"/>
-              <a:t>For jets with </a:t>
-            </a:r>
-            <a:r>
-              <a:rPr lang="en-US" dirty="0" err="1"/>
-              <a:t>n_vert</a:t>
-            </a:r>
-            <a:r>
-              <a:rPr lang="en-US" dirty="0"/>
-              <a:t>&lt;10 the missing entries are masked with -10.0.</a:t>
+              <a:t>Dark pion decay length = 0.5 mm.</a:t>
             </a:r>
           </a:p>
         </p:txBody>
@@ -3402,7 +3400,7 @@
     </p:spTree>
     <p:extLst>
       <p:ext uri="{BB962C8B-B14F-4D97-AF65-F5344CB8AC3E}">
-        <p14:creationId xmlns:p14="http://schemas.microsoft.com/office/powerpoint/2010/main" val="3125280800"/>
+        <p14:creationId xmlns:p14="http://schemas.microsoft.com/office/powerpoint/2010/main" val="846849521"/>
       </p:ext>
     </p:extLst>
   </p:cSld>
@@ -3434,7 +3432,7 @@
           <p:cNvPr id="2" name="Title 1">
             <a:extLst>
               <a:ext uri="{FF2B5EF4-FFF2-40B4-BE49-F238E27FC236}">
-                <a16:creationId xmlns:a16="http://schemas.microsoft.com/office/drawing/2014/main" id="{15A27E06-9FBE-4E43-9CB7-826B3DA542F9}"/>
+                <a16:creationId xmlns:a16="http://schemas.microsoft.com/office/drawing/2014/main" id="{988D4FAE-82D0-4146-AC2A-F516C314BC20}"/>
               </a:ext>
             </a:extLst>
           </p:cNvPr>
@@ -3452,44 +3450,69 @@
           <a:p>
             <a:r>
               <a:rPr lang="en-US" dirty="0"/>
-              <a:t>LSTM architecture and dataset size</a:t>
-            </a:r>
-          </a:p>
-        </p:txBody>
-      </p:sp>
-      <p:pic>
-        <p:nvPicPr>
-          <p:cNvPr id="4" name="Content Placeholder 4">
-            <a:extLst>
-              <a:ext uri="{FF2B5EF4-FFF2-40B4-BE49-F238E27FC236}">
-                <a16:creationId xmlns:a16="http://schemas.microsoft.com/office/drawing/2014/main" id="{E2DBE28F-978D-46EB-A283-6DC04A94B043}"/>
-              </a:ext>
-            </a:extLst>
-          </p:cNvPr>
-          <p:cNvPicPr>
-            <a:picLocks noGrp="1" noChangeAspect="1"/>
-          </p:cNvPicPr>
+              <a:t>Jet representation	</a:t>
+            </a:r>
+          </a:p>
+        </p:txBody>
+      </p:sp>
+      <p:sp>
+        <p:nvSpPr>
+          <p:cNvPr id="7" name="Content Placeholder 6">
+            <a:extLst>
+              <a:ext uri="{FF2B5EF4-FFF2-40B4-BE49-F238E27FC236}">
+                <a16:creationId xmlns:a16="http://schemas.microsoft.com/office/drawing/2014/main" id="{893B2DB4-C7D2-4EC1-B7A0-4B53CF8494C1}"/>
+              </a:ext>
+            </a:extLst>
+          </p:cNvPr>
+          <p:cNvSpPr>
+            <a:spLocks noGrp="1"/>
+          </p:cNvSpPr>
           <p:nvPr>
             <p:ph idx="1"/>
           </p:nvPr>
-        </p:nvPicPr>
-        <p:blipFill>
-          <a:blip r:embed="rId2"/>
-          <a:stretch>
-            <a:fillRect/>
-          </a:stretch>
-        </p:blipFill>
-        <p:spPr>
-          <a:xfrm>
-            <a:off x="3350976" y="2089332"/>
-            <a:ext cx="5490048" cy="4267474"/>
-          </a:xfrm>
-        </p:spPr>
-      </p:pic>
+        </p:nvSpPr>
+        <p:spPr/>
+        <p:txBody>
+          <a:bodyPr/>
+          <a:lstStyle/>
+          <a:p>
+            <a:r>
+              <a:rPr lang="en-US" dirty="0"/>
+              <a:t>Ten vertices with shortest displacement are extracted from each jet.</a:t>
+            </a:r>
+          </a:p>
+          <a:p>
+            <a:r>
+              <a:rPr lang="en-US" dirty="0"/>
+              <a:t>The data fields for each vertex are: vertex displacement, vertex multiplicity, and the magnitude of the vector sum of constituent PT.</a:t>
+            </a:r>
+          </a:p>
+          <a:p>
+            <a:r>
+              <a:rPr lang="en-US" dirty="0"/>
+              <a:t>For jets with </a:t>
+            </a:r>
+            <a:r>
+              <a:rPr lang="en-US" dirty="0" err="1"/>
+              <a:t>n_vert</a:t>
+            </a:r>
+            <a:r>
+              <a:rPr lang="en-US" dirty="0"/>
+              <a:t>&lt;10 the missing entries are masked with -10.0.</a:t>
+            </a:r>
+          </a:p>
+          <a:p>
+            <a:r>
+              <a:rPr lang="en-US" dirty="0"/>
+              <a:t>No further preprocessing was done.</a:t>
+            </a:r>
+          </a:p>
+        </p:txBody>
+      </p:sp>
     </p:spTree>
     <p:extLst>
       <p:ext uri="{BB962C8B-B14F-4D97-AF65-F5344CB8AC3E}">
-        <p14:creationId xmlns:p14="http://schemas.microsoft.com/office/powerpoint/2010/main" val="1614121148"/>
+        <p14:creationId xmlns:p14="http://schemas.microsoft.com/office/powerpoint/2010/main" val="3125280800"/>
       </p:ext>
     </p:extLst>
   </p:cSld>
@@ -3500,6 +3523,159 @@
 </file>
 
 <file path=ppt/slides/slide3.xml><?xml version="1.0" encoding="utf-8"?>
+<p:sld xmlns:a="http://schemas.openxmlformats.org/drawingml/2006/main" xmlns:r="http://schemas.openxmlformats.org/officeDocument/2006/relationships" xmlns:p="http://schemas.openxmlformats.org/presentationml/2006/main">
+  <p:cSld>
+    <p:spTree>
+      <p:nvGrpSpPr>
+        <p:cNvPr id="1" name=""/>
+        <p:cNvGrpSpPr/>
+        <p:nvPr/>
+      </p:nvGrpSpPr>
+      <p:grpSpPr>
+        <a:xfrm>
+          <a:off x="0" y="0"/>
+          <a:ext cx="0" cy="0"/>
+          <a:chOff x="0" y="0"/>
+          <a:chExt cx="0" cy="0"/>
+        </a:xfrm>
+      </p:grpSpPr>
+      <p:sp>
+        <p:nvSpPr>
+          <p:cNvPr id="2" name="Title 1">
+            <a:extLst>
+              <a:ext uri="{FF2B5EF4-FFF2-40B4-BE49-F238E27FC236}">
+                <a16:creationId xmlns:a16="http://schemas.microsoft.com/office/drawing/2014/main" id="{785B92DB-BAFD-44D9-8CED-06FED622FD14}"/>
+              </a:ext>
+            </a:extLst>
+          </p:cNvPr>
+          <p:cNvSpPr>
+            <a:spLocks noGrp="1"/>
+          </p:cNvSpPr>
+          <p:nvPr>
+            <p:ph type="title"/>
+          </p:nvPr>
+        </p:nvSpPr>
+        <p:spPr/>
+        <p:txBody>
+          <a:bodyPr>
+            <a:normAutofit/>
+          </a:bodyPr>
+          <a:lstStyle/>
+          <a:p>
+            <a:r>
+              <a:rPr lang="en-US" sz="4400" dirty="0"/>
+              <a:t>LSTM architecture</a:t>
+            </a:r>
+          </a:p>
+        </p:txBody>
+      </p:sp>
+      <p:sp>
+        <p:nvSpPr>
+          <p:cNvPr id="4" name="Text Placeholder 3">
+            <a:extLst>
+              <a:ext uri="{FF2B5EF4-FFF2-40B4-BE49-F238E27FC236}">
+                <a16:creationId xmlns:a16="http://schemas.microsoft.com/office/drawing/2014/main" id="{D4220933-9BAF-4D82-86EF-DB1C8ABA67E2}"/>
+              </a:ext>
+            </a:extLst>
+          </p:cNvPr>
+          <p:cNvSpPr>
+            <a:spLocks noGrp="1"/>
+          </p:cNvSpPr>
+          <p:nvPr>
+            <p:ph type="body" sz="half" idx="2"/>
+          </p:nvPr>
+        </p:nvSpPr>
+        <p:spPr/>
+        <p:txBody>
+          <a:bodyPr>
+            <a:normAutofit/>
+          </a:bodyPr>
+          <a:lstStyle/>
+          <a:p>
+            <a:pPr marL="285750" indent="-285750">
+              <a:buFont typeface="Arial" panose="020B0604020202020204" pitchFamily="34" charset="0"/>
+              <a:buChar char="•"/>
+            </a:pPr>
+            <a:r>
+              <a:rPr lang="en-US" sz="2800" dirty="0"/>
+              <a:t>Masking layer.</a:t>
+            </a:r>
+          </a:p>
+          <a:p>
+            <a:pPr marL="285750" indent="-285750">
+              <a:buFont typeface="Arial" panose="020B0604020202020204" pitchFamily="34" charset="0"/>
+              <a:buChar char="•"/>
+            </a:pPr>
+            <a:r>
+              <a:rPr lang="en-US" sz="2800" dirty="0"/>
+              <a:t>Single LSTM layer.</a:t>
+            </a:r>
+          </a:p>
+          <a:p>
+            <a:pPr marL="285750" indent="-285750">
+              <a:buFont typeface="Arial" panose="020B0604020202020204" pitchFamily="34" charset="0"/>
+              <a:buChar char="•"/>
+            </a:pPr>
+            <a:r>
+              <a:rPr lang="en-US" sz="2800" dirty="0"/>
+              <a:t>Two dense layers.</a:t>
+            </a:r>
+          </a:p>
+          <a:p>
+            <a:pPr marL="285750" indent="-285750">
+              <a:buFont typeface="Arial" panose="020B0604020202020204" pitchFamily="34" charset="0"/>
+              <a:buChar char="•"/>
+            </a:pPr>
+            <a:r>
+              <a:rPr lang="en-US" sz="2800" dirty="0"/>
+              <a:t>No regularization.</a:t>
+            </a:r>
+          </a:p>
+        </p:txBody>
+      </p:sp>
+      <p:pic>
+        <p:nvPicPr>
+          <p:cNvPr id="5" name="Content Placeholder 4">
+            <a:extLst>
+              <a:ext uri="{FF2B5EF4-FFF2-40B4-BE49-F238E27FC236}">
+                <a16:creationId xmlns:a16="http://schemas.microsoft.com/office/drawing/2014/main" id="{B25A99BD-EE2B-4FE3-B92B-958D89689D8F}"/>
+              </a:ext>
+            </a:extLst>
+          </p:cNvPr>
+          <p:cNvPicPr>
+            <a:picLocks noGrp="1" noChangeAspect="1"/>
+          </p:cNvPicPr>
+          <p:nvPr>
+            <p:ph idx="1"/>
+          </p:nvPr>
+        </p:nvPicPr>
+        <p:blipFill>
+          <a:blip r:embed="rId2"/>
+          <a:stretch>
+            <a:fillRect/>
+          </a:stretch>
+        </p:blipFill>
+        <p:spPr>
+          <a:xfrm>
+            <a:off x="5345369" y="759402"/>
+            <a:ext cx="6327821" cy="4918685"/>
+          </a:xfrm>
+        </p:spPr>
+      </p:pic>
+    </p:spTree>
+    <p:extLst>
+      <p:ext uri="{BB962C8B-B14F-4D97-AF65-F5344CB8AC3E}">
+        <p14:creationId xmlns:p14="http://schemas.microsoft.com/office/powerpoint/2010/main" val="3010414202"/>
+      </p:ext>
+    </p:extLst>
+  </p:cSld>
+  <p:clrMapOvr>
+    <a:masterClrMapping/>
+  </p:clrMapOvr>
+</p:sld>
+</file>
+
+<file path=ppt/slides/slide4.xml><?xml version="1.0" encoding="utf-8"?>
 <p:sld xmlns:a="http://schemas.openxmlformats.org/drawingml/2006/main" xmlns:r="http://schemas.openxmlformats.org/officeDocument/2006/relationships" xmlns:p="http://schemas.openxmlformats.org/presentationml/2006/main">
   <p:cSld>
     <p:spTree>

</xml_diff>